<commit_message>
change logo format (for twitter)
</commit_message>
<xml_diff>
--- a/assets/media/logo.pptx
+++ b/assets/media/logo.pptx
@@ -346,7 +346,7 @@
           <a:p>
             <a:fld id="{8376FA21-1A69-004C-9059-E8160706B0E0}" type="datetimeFigureOut">
               <a:rPr kumimoji="1" lang="ja-JP" altLang="en-US" smtClean="0"/>
-              <a:t>2023/11/16</a:t>
+              <a:t>2023/12/14</a:t>
             </a:fld>
             <a:endParaRPr kumimoji="1" lang="ja-JP" altLang="en-US"/>
           </a:p>
@@ -576,7 +576,7 @@
           <a:p>
             <a:fld id="{8376FA21-1A69-004C-9059-E8160706B0E0}" type="datetimeFigureOut">
               <a:rPr kumimoji="1" lang="ja-JP" altLang="en-US" smtClean="0"/>
-              <a:t>2023/11/16</a:t>
+              <a:t>2023/12/14</a:t>
             </a:fld>
             <a:endParaRPr kumimoji="1" lang="ja-JP" altLang="en-US"/>
           </a:p>
@@ -816,7 +816,7 @@
           <a:p>
             <a:fld id="{8376FA21-1A69-004C-9059-E8160706B0E0}" type="datetimeFigureOut">
               <a:rPr kumimoji="1" lang="ja-JP" altLang="en-US" smtClean="0"/>
-              <a:t>2023/11/16</a:t>
+              <a:t>2023/12/14</a:t>
             </a:fld>
             <a:endParaRPr kumimoji="1" lang="ja-JP" altLang="en-US"/>
           </a:p>
@@ -1046,7 +1046,7 @@
           <a:p>
             <a:fld id="{8376FA21-1A69-004C-9059-E8160706B0E0}" type="datetimeFigureOut">
               <a:rPr kumimoji="1" lang="ja-JP" altLang="en-US" smtClean="0"/>
-              <a:t>2023/11/16</a:t>
+              <a:t>2023/12/14</a:t>
             </a:fld>
             <a:endParaRPr kumimoji="1" lang="ja-JP" altLang="en-US"/>
           </a:p>
@@ -1321,7 +1321,7 @@
           <a:p>
             <a:fld id="{8376FA21-1A69-004C-9059-E8160706B0E0}" type="datetimeFigureOut">
               <a:rPr kumimoji="1" lang="ja-JP" altLang="en-US" smtClean="0"/>
-              <a:t>2023/11/16</a:t>
+              <a:t>2023/12/14</a:t>
             </a:fld>
             <a:endParaRPr kumimoji="1" lang="ja-JP" altLang="en-US"/>
           </a:p>
@@ -1650,7 +1650,7 @@
           <a:p>
             <a:fld id="{8376FA21-1A69-004C-9059-E8160706B0E0}" type="datetimeFigureOut">
               <a:rPr kumimoji="1" lang="ja-JP" altLang="en-US" smtClean="0"/>
-              <a:t>2023/11/16</a:t>
+              <a:t>2023/12/14</a:t>
             </a:fld>
             <a:endParaRPr kumimoji="1" lang="ja-JP" altLang="en-US"/>
           </a:p>
@@ -2126,7 +2126,7 @@
           <a:p>
             <a:fld id="{8376FA21-1A69-004C-9059-E8160706B0E0}" type="datetimeFigureOut">
               <a:rPr kumimoji="1" lang="ja-JP" altLang="en-US" smtClean="0"/>
-              <a:t>2023/11/16</a:t>
+              <a:t>2023/12/14</a:t>
             </a:fld>
             <a:endParaRPr kumimoji="1" lang="ja-JP" altLang="en-US"/>
           </a:p>
@@ -2267,7 +2267,7 @@
           <a:p>
             <a:fld id="{8376FA21-1A69-004C-9059-E8160706B0E0}" type="datetimeFigureOut">
               <a:rPr kumimoji="1" lang="ja-JP" altLang="en-US" smtClean="0"/>
-              <a:t>2023/11/16</a:t>
+              <a:t>2023/12/14</a:t>
             </a:fld>
             <a:endParaRPr kumimoji="1" lang="ja-JP" altLang="en-US"/>
           </a:p>
@@ -2380,7 +2380,7 @@
           <a:p>
             <a:fld id="{8376FA21-1A69-004C-9059-E8160706B0E0}" type="datetimeFigureOut">
               <a:rPr kumimoji="1" lang="ja-JP" altLang="en-US" smtClean="0"/>
-              <a:t>2023/11/16</a:t>
+              <a:t>2023/12/14</a:t>
             </a:fld>
             <a:endParaRPr kumimoji="1" lang="ja-JP" altLang="en-US"/>
           </a:p>
@@ -2723,7 +2723,7 @@
           <a:p>
             <a:fld id="{8376FA21-1A69-004C-9059-E8160706B0E0}" type="datetimeFigureOut">
               <a:rPr kumimoji="1" lang="ja-JP" altLang="en-US" smtClean="0"/>
-              <a:t>2023/11/16</a:t>
+              <a:t>2023/12/14</a:t>
             </a:fld>
             <a:endParaRPr kumimoji="1" lang="ja-JP" altLang="en-US"/>
           </a:p>
@@ -3011,7 +3011,7 @@
           <a:p>
             <a:fld id="{8376FA21-1A69-004C-9059-E8160706B0E0}" type="datetimeFigureOut">
               <a:rPr kumimoji="1" lang="ja-JP" altLang="en-US" smtClean="0"/>
-              <a:t>2023/11/16</a:t>
+              <a:t>2023/12/14</a:t>
             </a:fld>
             <a:endParaRPr kumimoji="1" lang="ja-JP" altLang="en-US"/>
           </a:p>
@@ -3284,7 +3284,7 @@
           <a:p>
             <a:fld id="{8376FA21-1A69-004C-9059-E8160706B0E0}" type="datetimeFigureOut">
               <a:rPr kumimoji="1" lang="ja-JP" altLang="en-US" smtClean="0"/>
-              <a:t>2023/11/16</a:t>
+              <a:t>2023/12/14</a:t>
             </a:fld>
             <a:endParaRPr kumimoji="1" lang="ja-JP" altLang="en-US"/>
           </a:p>
@@ -3732,9 +3732,7 @@
             <a:r>
               <a:rPr kumimoji="1" lang="ja-JP" altLang="en-US" sz="3200" b="1">
                 <a:ln w="12700">
-                  <a:solidFill>
-                    <a:schemeClr val="bg1"/>
-                  </a:solidFill>
+                  <a:noFill/>
                 </a:ln>
                 <a:latin typeface="UD Digi Kyokasho NP-B" panose="02020700000000000000" pitchFamily="18" charset="-128"/>
                 <a:ea typeface="UD Digi Kyokasho NP-B" panose="02020700000000000000" pitchFamily="18" charset="-128"/>
@@ -3743,9 +3741,7 @@
             </a:r>
             <a:endParaRPr kumimoji="1" lang="en-US" altLang="ja-JP" sz="3200" b="1" dirty="0">
               <a:ln w="12700">
-                <a:solidFill>
-                  <a:schemeClr val="bg1"/>
-                </a:solidFill>
+                <a:noFill/>
               </a:ln>
               <a:latin typeface="UD Digi Kyokasho NP-B" panose="02020700000000000000" pitchFamily="18" charset="-128"/>
               <a:ea typeface="UD Digi Kyokasho NP-B" panose="02020700000000000000" pitchFamily="18" charset="-128"/>
@@ -3755,9 +3751,7 @@
             <a:r>
               <a:rPr kumimoji="1" lang="ja-JP" altLang="en-US" sz="4400" b="1">
                 <a:ln w="12700">
-                  <a:solidFill>
-                    <a:schemeClr val="bg1"/>
-                  </a:solidFill>
+                  <a:noFill/>
                 </a:ln>
                 <a:latin typeface="UD Digi Kyokasho NP-B" panose="02020700000000000000" pitchFamily="18" charset="-128"/>
                 <a:ea typeface="UD Digi Kyokasho NP-B" panose="02020700000000000000" pitchFamily="18" charset="-128"/>
@@ -3766,9 +3760,7 @@
             </a:r>
             <a:endParaRPr kumimoji="1" lang="en-US" altLang="ja-JP" sz="4400" b="1" dirty="0">
               <a:ln w="12700">
-                <a:solidFill>
-                  <a:schemeClr val="bg1"/>
-                </a:solidFill>
+                <a:noFill/>
               </a:ln>
               <a:latin typeface="UD Digi Kyokasho NP-B" panose="02020700000000000000" pitchFamily="18" charset="-128"/>
               <a:ea typeface="UD Digi Kyokasho NP-B" panose="02020700000000000000" pitchFamily="18" charset="-128"/>
@@ -3778,9 +3770,7 @@
             <a:r>
               <a:rPr lang="ja-JP" altLang="en-US" sz="4400" b="1">
                 <a:ln w="12700">
-                  <a:solidFill>
-                    <a:schemeClr val="bg1"/>
-                  </a:solidFill>
+                  <a:noFill/>
                 </a:ln>
                 <a:latin typeface="UD Digi Kyokasho NP-B" panose="02020700000000000000" pitchFamily="18" charset="-128"/>
                 <a:ea typeface="UD Digi Kyokasho NP-B" panose="02020700000000000000" pitchFamily="18" charset="-128"/>
@@ -3789,9 +3779,7 @@
             </a:r>
             <a:endParaRPr lang="en-US" altLang="ja-JP" sz="4400" b="1" dirty="0">
               <a:ln w="12700">
-                <a:solidFill>
-                  <a:schemeClr val="bg1"/>
-                </a:solidFill>
+                <a:noFill/>
               </a:ln>
               <a:latin typeface="UD Digi Kyokasho NP-B" panose="02020700000000000000" pitchFamily="18" charset="-128"/>
               <a:ea typeface="UD Digi Kyokasho NP-B" panose="02020700000000000000" pitchFamily="18" charset="-128"/>

</xml_diff>